<commit_message>
Done with slides v2
</commit_message>
<xml_diff>
--- a/slides/xmcd.pptx
+++ b/slides/xmcd.pptx
@@ -20,21 +20,22 @@
     <p:sldId id="265" r:id="rId14"/>
     <p:sldId id="266" r:id="rId15"/>
     <p:sldId id="267" r:id="rId16"/>
+    <p:sldId id="268" r:id="rId17"/>
   </p:sldIdLst>
   <p:sldSz cy="5143500" cx="9144000"/>
   <p:notesSz cx="6858000" cy="9144000"/>
   <p:embeddedFontLst>
     <p:embeddedFont>
       <p:font typeface="Roboto Slab"/>
-      <p:regular r:id="rId17"/>
-      <p:bold r:id="rId18"/>
+      <p:regular r:id="rId18"/>
+      <p:bold r:id="rId19"/>
     </p:embeddedFont>
     <p:embeddedFont>
       <p:font typeface="Roboto"/>
-      <p:regular r:id="rId19"/>
-      <p:bold r:id="rId20"/>
-      <p:italic r:id="rId21"/>
-      <p:boldItalic r:id="rId22"/>
+      <p:regular r:id="rId20"/>
+      <p:bold r:id="rId21"/>
+      <p:italic r:id="rId22"/>
+      <p:boldItalic r:id="rId23"/>
     </p:embeddedFont>
   </p:embeddedFontLst>
   <p:defaultTextStyle>
@@ -813,7 +814,7 @@
       </p:grpSpPr>
       <p:sp>
         <p:nvSpPr>
-          <p:cNvPr id="272" name="Google Shape;272;g6c12641c3f_0_10:notes"/>
+          <p:cNvPr id="272" name="Google Shape;272;g6c12641c3f_0_19:notes"/>
           <p:cNvSpPr/>
           <p:nvPr>
             <p:ph idx="2" type="sldImg"/>
@@ -848,7 +849,7 @@
       </p:sp>
       <p:sp>
         <p:nvSpPr>
-          <p:cNvPr id="273" name="Google Shape;273;g6c12641c3f_0_10:notes"/>
+          <p:cNvPr id="273" name="Google Shape;273;g6c12641c3f_0_19:notes"/>
           <p:cNvSpPr txBox="1"/>
           <p:nvPr>
             <p:ph idx="1" type="body"/>
@@ -898,7 +899,7 @@
   <p:cSld>
     <p:spTree>
       <p:nvGrpSpPr>
-        <p:cNvPr id="278" name="Shape 278"/>
+        <p:cNvPr id="276" name="Shape 276"/>
         <p:cNvGrpSpPr/>
         <p:nvPr/>
       </p:nvGrpSpPr>
@@ -912,7 +913,7 @@
       </p:grpSpPr>
       <p:sp>
         <p:nvSpPr>
-          <p:cNvPr id="279" name="Google Shape;279;g6c12641c3f_0_16:notes"/>
+          <p:cNvPr id="277" name="Google Shape;277;g6c12641c3f_0_10:notes"/>
           <p:cNvSpPr/>
           <p:nvPr>
             <p:ph idx="2" type="sldImg"/>
@@ -947,7 +948,7 @@
       </p:sp>
       <p:sp>
         <p:nvSpPr>
-          <p:cNvPr id="280" name="Google Shape;280;g6c12641c3f_0_16:notes"/>
+          <p:cNvPr id="278" name="Google Shape;278;g6c12641c3f_0_10:notes"/>
           <p:cNvSpPr txBox="1"/>
           <p:nvPr>
             <p:ph idx="1" type="body"/>
@@ -997,7 +998,7 @@
   <p:cSld>
     <p:spTree>
       <p:nvGrpSpPr>
-        <p:cNvPr id="287" name="Shape 287"/>
+        <p:cNvPr id="283" name="Shape 283"/>
         <p:cNvGrpSpPr/>
         <p:nvPr/>
       </p:nvGrpSpPr>
@@ -1011,7 +1012,7 @@
       </p:grpSpPr>
       <p:sp>
         <p:nvSpPr>
-          <p:cNvPr id="288" name="Google Shape;288;g6c12641c3f_0_13:notes"/>
+          <p:cNvPr id="284" name="Google Shape;284;g6c12641c3f_0_16:notes"/>
           <p:cNvSpPr/>
           <p:nvPr>
             <p:ph idx="2" type="sldImg"/>
@@ -1046,7 +1047,106 @@
       </p:sp>
       <p:sp>
         <p:nvSpPr>
-          <p:cNvPr id="289" name="Google Shape;289;g6c12641c3f_0_13:notes"/>
+          <p:cNvPr id="285" name="Google Shape;285;g6c12641c3f_0_16:notes"/>
+          <p:cNvSpPr txBox="1"/>
+          <p:nvPr>
+            <p:ph idx="1" type="body"/>
+          </p:nvPr>
+        </p:nvSpPr>
+        <p:spPr>
+          <a:xfrm>
+            <a:off x="685800" y="4343400"/>
+            <a:ext cx="5486400" cy="4114800"/>
+          </a:xfrm>
+          <a:prstGeom prst="rect">
+            <a:avLst/>
+          </a:prstGeom>
+        </p:spPr>
+        <p:txBody>
+          <a:bodyPr anchorCtr="0" anchor="t" bIns="91425" lIns="91425" spcFirstLastPara="1" rIns="91425" wrap="square" tIns="91425">
+            <a:noAutofit/>
+          </a:bodyPr>
+          <a:lstStyle/>
+          <a:p>
+            <a:pPr indent="0" lvl="0" marL="0" rtl="0" algn="l">
+              <a:spcBef>
+                <a:spcPts val="0"/>
+              </a:spcBef>
+              <a:spcAft>
+                <a:spcPts val="0"/>
+              </a:spcAft>
+              <a:buNone/>
+            </a:pPr>
+            <a:r>
+              <a:t/>
+            </a:r>
+            <a:endParaRPr/>
+          </a:p>
+        </p:txBody>
+      </p:sp>
+    </p:spTree>
+  </p:cSld>
+  <p:clrMapOvr>
+    <a:masterClrMapping/>
+  </p:clrMapOvr>
+</p:notes>
+</file>
+
+<file path=ppt/notesSlides/notesSlide13.xml><?xml version="1.0" encoding="utf-8"?>
+<p:notes xmlns:a="http://schemas.openxmlformats.org/drawingml/2006/main" xmlns:r="http://schemas.openxmlformats.org/officeDocument/2006/relationships" xmlns:mc="http://schemas.openxmlformats.org/markup-compatibility/2006" xmlns:mv="urn:schemas-microsoft-com:mac:vml" xmlns:p="http://schemas.openxmlformats.org/presentationml/2006/main" xmlns:c="http://schemas.openxmlformats.org/drawingml/2006/chart" xmlns:dgm="http://schemas.openxmlformats.org/drawingml/2006/diagram" xmlns:o="urn:schemas-microsoft-com:office:office" xmlns:v="urn:schemas-microsoft-com:vml" xmlns:pvml="urn:schemas-microsoft-com:office:powerpoint" xmlns:com="http://schemas.openxmlformats.org/drawingml/2006/compatibility" xmlns:p14="http://schemas.microsoft.com/office/powerpoint/2010/main" xmlns:p15="http://schemas.microsoft.com/office/powerpoint/2012/main" showMasterPhAnim="0" showMasterSp="0">
+  <p:cSld>
+    <p:spTree>
+      <p:nvGrpSpPr>
+        <p:cNvPr id="292" name="Shape 292"/>
+        <p:cNvGrpSpPr/>
+        <p:nvPr/>
+      </p:nvGrpSpPr>
+      <p:grpSpPr>
+        <a:xfrm>
+          <a:off x="0" y="0"/>
+          <a:ext cx="0" cy="0"/>
+          <a:chOff x="0" y="0"/>
+          <a:chExt cx="0" cy="0"/>
+        </a:xfrm>
+      </p:grpSpPr>
+      <p:sp>
+        <p:nvSpPr>
+          <p:cNvPr id="293" name="Google Shape;293;g6c12641c3f_0_13:notes"/>
+          <p:cNvSpPr/>
+          <p:nvPr>
+            <p:ph idx="2" type="sldImg"/>
+          </p:nvPr>
+        </p:nvSpPr>
+        <p:spPr>
+          <a:xfrm>
+            <a:off x="381300" y="685800"/>
+            <a:ext cx="6096000" cy="3429000"/>
+          </a:xfrm>
+          <a:custGeom>
+            <a:rect b="b" l="l" r="r" t="t"/>
+            <a:pathLst>
+              <a:path extrusionOk="0" h="120000" w="120000">
+                <a:moveTo>
+                  <a:pt x="0" y="0"/>
+                </a:moveTo>
+                <a:lnTo>
+                  <a:pt x="120000" y="0"/>
+                </a:lnTo>
+                <a:lnTo>
+                  <a:pt x="120000" y="120000"/>
+                </a:lnTo>
+                <a:lnTo>
+                  <a:pt x="0" y="120000"/>
+                </a:lnTo>
+                <a:close/>
+              </a:path>
+            </a:pathLst>
+          </a:custGeom>
+        </p:spPr>
+      </p:sp>
+      <p:sp>
+        <p:nvSpPr>
+          <p:cNvPr id="294" name="Google Shape;294;g6c12641c3f_0_13:notes"/>
           <p:cNvSpPr txBox="1"/>
           <p:nvPr>
             <p:ph idx="1" type="body"/>
@@ -1605,7 +1705,7 @@
       </p:grpSpPr>
       <p:sp>
         <p:nvSpPr>
-          <p:cNvPr id="250" name="Google Shape;250;g6c12641c3f_2_55:notes"/>
+          <p:cNvPr id="250" name="Google Shape;250;g6c12641c3f_2_75:notes"/>
           <p:cNvSpPr/>
           <p:nvPr>
             <p:ph idx="2" type="sldImg"/>
@@ -1640,7 +1740,7 @@
       </p:sp>
       <p:sp>
         <p:nvSpPr>
-          <p:cNvPr id="251" name="Google Shape;251;g6c12641c3f_2_55:notes"/>
+          <p:cNvPr id="251" name="Google Shape;251;g6c12641c3f_2_75:notes"/>
           <p:cNvSpPr txBox="1"/>
           <p:nvPr>
             <p:ph idx="1" type="body"/>
@@ -1690,7 +1790,7 @@
   <p:cSld>
     <p:spTree>
       <p:nvGrpSpPr>
-        <p:cNvPr id="256" name="Shape 256"/>
+        <p:cNvPr id="254" name="Shape 254"/>
         <p:cNvGrpSpPr/>
         <p:nvPr/>
       </p:nvGrpSpPr>
@@ -1704,7 +1804,7 @@
       </p:grpSpPr>
       <p:sp>
         <p:nvSpPr>
-          <p:cNvPr id="257" name="Google Shape;257;g6c12641c3f_2_62:notes"/>
+          <p:cNvPr id="255" name="Google Shape;255;g6c12641c3f_2_55:notes"/>
           <p:cNvSpPr/>
           <p:nvPr>
             <p:ph idx="2" type="sldImg"/>
@@ -1739,7 +1839,7 @@
       </p:sp>
       <p:sp>
         <p:nvSpPr>
-          <p:cNvPr id="258" name="Google Shape;258;g6c12641c3f_2_62:notes"/>
+          <p:cNvPr id="256" name="Google Shape;256;g6c12641c3f_2_55:notes"/>
           <p:cNvSpPr txBox="1"/>
           <p:nvPr>
             <p:ph idx="1" type="body"/>
@@ -1789,7 +1889,7 @@
   <p:cSld>
     <p:spTree>
       <p:nvGrpSpPr>
-        <p:cNvPr id="266" name="Shape 266"/>
+        <p:cNvPr id="261" name="Shape 261"/>
         <p:cNvGrpSpPr/>
         <p:nvPr/>
       </p:nvGrpSpPr>
@@ -1803,7 +1903,7 @@
       </p:grpSpPr>
       <p:sp>
         <p:nvSpPr>
-          <p:cNvPr id="267" name="Google Shape;267;g6c12641c3f_0_19:notes"/>
+          <p:cNvPr id="262" name="Google Shape;262;g6c12641c3f_2_62:notes"/>
           <p:cNvSpPr/>
           <p:nvPr>
             <p:ph idx="2" type="sldImg"/>
@@ -1838,7 +1938,7 @@
       </p:sp>
       <p:sp>
         <p:nvSpPr>
-          <p:cNvPr id="268" name="Google Shape;268;g6c12641c3f_0_19:notes"/>
+          <p:cNvPr id="263" name="Google Shape;263;g6c12641c3f_2_62:notes"/>
           <p:cNvSpPr txBox="1"/>
           <p:nvPr>
             <p:ph idx="1" type="body"/>
@@ -13772,9 +13872,62 @@
           <a:chExt cx="0" cy="0"/>
         </a:xfrm>
       </p:grpSpPr>
+      <p:pic>
+        <p:nvPicPr>
+          <p:cNvPr id="275" name="Google Shape;275;p23"/>
+          <p:cNvPicPr preferRelativeResize="0"/>
+          <p:nvPr/>
+        </p:nvPicPr>
+        <p:blipFill>
+          <a:blip r:embed="rId3">
+            <a:alphaModFix/>
+          </a:blip>
+          <a:stretch>
+            <a:fillRect/>
+          </a:stretch>
+        </p:blipFill>
+        <p:spPr>
+          <a:xfrm>
+            <a:off x="152400" y="152400"/>
+            <a:ext cx="5735671" cy="4838701"/>
+          </a:xfrm>
+          <a:prstGeom prst="rect">
+            <a:avLst/>
+          </a:prstGeom>
+          <a:noFill/>
+          <a:ln>
+            <a:noFill/>
+          </a:ln>
+        </p:spPr>
+      </p:pic>
+    </p:spTree>
+  </p:cSld>
+  <p:clrMapOvr>
+    <a:masterClrMapping/>
+  </p:clrMapOvr>
+</p:sld>
+</file>
+
+<file path=ppt/slides/slide11.xml><?xml version="1.0" encoding="utf-8"?>
+<p:sld xmlns:a="http://schemas.openxmlformats.org/drawingml/2006/main" xmlns:r="http://schemas.openxmlformats.org/officeDocument/2006/relationships" xmlns:mc="http://schemas.openxmlformats.org/markup-compatibility/2006" xmlns:mv="urn:schemas-microsoft-com:mac:vml" xmlns:p="http://schemas.openxmlformats.org/presentationml/2006/main" xmlns:c="http://schemas.openxmlformats.org/drawingml/2006/chart" xmlns:dgm="http://schemas.openxmlformats.org/drawingml/2006/diagram" xmlns:o="urn:schemas-microsoft-com:office:office" xmlns:v="urn:schemas-microsoft-com:vml" xmlns:pvml="urn:schemas-microsoft-com:office:powerpoint" xmlns:com="http://schemas.openxmlformats.org/drawingml/2006/compatibility" xmlns:p14="http://schemas.microsoft.com/office/powerpoint/2010/main" xmlns:p15="http://schemas.microsoft.com/office/powerpoint/2012/main">
+  <p:cSld>
+    <p:spTree>
+      <p:nvGrpSpPr>
+        <p:cNvPr id="279" name="Shape 279"/>
+        <p:cNvGrpSpPr/>
+        <p:nvPr/>
+      </p:nvGrpSpPr>
+      <p:grpSpPr>
+        <a:xfrm>
+          <a:off x="0" y="0"/>
+          <a:ext cx="0" cy="0"/>
+          <a:chOff x="0" y="0"/>
+          <a:chExt cx="0" cy="0"/>
+        </a:xfrm>
+      </p:grpSpPr>
       <p:sp>
         <p:nvSpPr>
-          <p:cNvPr id="275" name="Google Shape;275;p23"/>
+          <p:cNvPr id="280" name="Google Shape;280;p24"/>
           <p:cNvSpPr txBox="1"/>
           <p:nvPr/>
         </p:nvSpPr>
@@ -13888,7 +14041,7 @@
       </p:sp>
       <p:sp>
         <p:nvSpPr>
-          <p:cNvPr id="276" name="Google Shape;276;p23"/>
+          <p:cNvPr id="281" name="Google Shape;281;p24"/>
           <p:cNvSpPr txBox="1"/>
           <p:nvPr/>
         </p:nvSpPr>
@@ -14062,7 +14215,7 @@
       </p:sp>
       <p:pic>
         <p:nvPicPr>
-          <p:cNvPr id="277" name="Google Shape;277;p23"/>
+          <p:cNvPr id="282" name="Google Shape;282;p24"/>
           <p:cNvPicPr preferRelativeResize="0"/>
           <p:nvPr/>
         </p:nvPicPr>
@@ -14096,12 +14249,12 @@
 </p:sld>
 </file>
 
-<file path=ppt/slides/slide11.xml><?xml version="1.0" encoding="utf-8"?>
+<file path=ppt/slides/slide12.xml><?xml version="1.0" encoding="utf-8"?>
 <p:sld xmlns:a="http://schemas.openxmlformats.org/drawingml/2006/main" xmlns:r="http://schemas.openxmlformats.org/officeDocument/2006/relationships" xmlns:mc="http://schemas.openxmlformats.org/markup-compatibility/2006" xmlns:mv="urn:schemas-microsoft-com:mac:vml" xmlns:p="http://schemas.openxmlformats.org/presentationml/2006/main" xmlns:c="http://schemas.openxmlformats.org/drawingml/2006/chart" xmlns:dgm="http://schemas.openxmlformats.org/drawingml/2006/diagram" xmlns:o="urn:schemas-microsoft-com:office:office" xmlns:v="urn:schemas-microsoft-com:vml" xmlns:pvml="urn:schemas-microsoft-com:office:powerpoint" xmlns:com="http://schemas.openxmlformats.org/drawingml/2006/compatibility" xmlns:p14="http://schemas.microsoft.com/office/powerpoint/2010/main" xmlns:p15="http://schemas.microsoft.com/office/powerpoint/2012/main">
   <p:cSld>
     <p:spTree>
       <p:nvGrpSpPr>
-        <p:cNvPr id="281" name="Shape 281"/>
+        <p:cNvPr id="286" name="Shape 286"/>
         <p:cNvGrpSpPr/>
         <p:nvPr/>
       </p:nvGrpSpPr>
@@ -14115,7 +14268,7 @@
       </p:grpSpPr>
       <p:sp>
         <p:nvSpPr>
-          <p:cNvPr id="282" name="Google Shape;282;p24"/>
+          <p:cNvPr id="287" name="Google Shape;287;p25"/>
           <p:cNvSpPr txBox="1"/>
           <p:nvPr/>
         </p:nvSpPr>
@@ -14167,7 +14320,7 @@
       </p:sp>
       <p:sp>
         <p:nvSpPr>
-          <p:cNvPr id="283" name="Google Shape;283;p24"/>
+          <p:cNvPr id="288" name="Google Shape;288;p25"/>
           <p:cNvSpPr txBox="1"/>
           <p:nvPr/>
         </p:nvSpPr>
@@ -14265,7 +14418,7 @@
       </p:sp>
       <p:sp>
         <p:nvSpPr>
-          <p:cNvPr id="284" name="Google Shape;284;p24"/>
+          <p:cNvPr id="289" name="Google Shape;289;p25"/>
           <p:cNvSpPr txBox="1"/>
           <p:nvPr/>
         </p:nvSpPr>
@@ -14409,7 +14562,7 @@
       </p:sp>
       <p:pic>
         <p:nvPicPr>
-          <p:cNvPr id="285" name="Google Shape;285;p24"/>
+          <p:cNvPr id="290" name="Google Shape;290;p25"/>
           <p:cNvPicPr preferRelativeResize="0"/>
           <p:nvPr/>
         </p:nvPicPr>
@@ -14437,7 +14590,7 @@
       </p:pic>
       <p:pic>
         <p:nvPicPr>
-          <p:cNvPr id="286" name="Google Shape;286;p24"/>
+          <p:cNvPr id="291" name="Google Shape;291;p25"/>
           <p:cNvPicPr preferRelativeResize="0"/>
           <p:nvPr/>
         </p:nvPicPr>
@@ -14471,12 +14624,12 @@
 </p:sld>
 </file>
 
-<file path=ppt/slides/slide12.xml><?xml version="1.0" encoding="utf-8"?>
+<file path=ppt/slides/slide13.xml><?xml version="1.0" encoding="utf-8"?>
 <p:sld xmlns:a="http://schemas.openxmlformats.org/drawingml/2006/main" xmlns:r="http://schemas.openxmlformats.org/officeDocument/2006/relationships" xmlns:mc="http://schemas.openxmlformats.org/markup-compatibility/2006" xmlns:mv="urn:schemas-microsoft-com:mac:vml" xmlns:p="http://schemas.openxmlformats.org/presentationml/2006/main" xmlns:c="http://schemas.openxmlformats.org/drawingml/2006/chart" xmlns:dgm="http://schemas.openxmlformats.org/drawingml/2006/diagram" xmlns:o="urn:schemas-microsoft-com:office:office" xmlns:v="urn:schemas-microsoft-com:vml" xmlns:pvml="urn:schemas-microsoft-com:office:powerpoint" xmlns:com="http://schemas.openxmlformats.org/drawingml/2006/compatibility" xmlns:p14="http://schemas.microsoft.com/office/powerpoint/2010/main" xmlns:p15="http://schemas.microsoft.com/office/powerpoint/2012/main">
   <p:cSld>
     <p:spTree>
       <p:nvGrpSpPr>
-        <p:cNvPr id="290" name="Shape 290"/>
+        <p:cNvPr id="295" name="Shape 295"/>
         <p:cNvGrpSpPr/>
         <p:nvPr/>
       </p:nvGrpSpPr>
@@ -14490,7 +14643,7 @@
       </p:grpSpPr>
       <p:sp>
         <p:nvSpPr>
-          <p:cNvPr id="291" name="Google Shape;291;p25"/>
+          <p:cNvPr id="296" name="Google Shape;296;p26"/>
           <p:cNvSpPr txBox="1"/>
           <p:nvPr/>
         </p:nvSpPr>
@@ -16540,9 +16693,62 @@
           <a:chExt cx="0" cy="0"/>
         </a:xfrm>
       </p:grpSpPr>
+      <p:pic>
+        <p:nvPicPr>
+          <p:cNvPr id="253" name="Google Shape;253;p20"/>
+          <p:cNvPicPr preferRelativeResize="0"/>
+          <p:nvPr/>
+        </p:nvPicPr>
+        <p:blipFill>
+          <a:blip r:embed="rId3">
+            <a:alphaModFix/>
+          </a:blip>
+          <a:stretch>
+            <a:fillRect/>
+          </a:stretch>
+        </p:blipFill>
+        <p:spPr>
+          <a:xfrm>
+            <a:off x="152400" y="152400"/>
+            <a:ext cx="8839200" cy="4121090"/>
+          </a:xfrm>
+          <a:prstGeom prst="rect">
+            <a:avLst/>
+          </a:prstGeom>
+          <a:noFill/>
+          <a:ln>
+            <a:noFill/>
+          </a:ln>
+        </p:spPr>
+      </p:pic>
+    </p:spTree>
+  </p:cSld>
+  <p:clrMapOvr>
+    <a:masterClrMapping/>
+  </p:clrMapOvr>
+</p:sld>
+</file>
+
+<file path=ppt/slides/slide8.xml><?xml version="1.0" encoding="utf-8"?>
+<p:sld xmlns:a="http://schemas.openxmlformats.org/drawingml/2006/main" xmlns:r="http://schemas.openxmlformats.org/officeDocument/2006/relationships" xmlns:mc="http://schemas.openxmlformats.org/markup-compatibility/2006" xmlns:mv="urn:schemas-microsoft-com:mac:vml" xmlns:p="http://schemas.openxmlformats.org/presentationml/2006/main" xmlns:c="http://schemas.openxmlformats.org/drawingml/2006/chart" xmlns:dgm="http://schemas.openxmlformats.org/drawingml/2006/diagram" xmlns:o="urn:schemas-microsoft-com:office:office" xmlns:v="urn:schemas-microsoft-com:vml" xmlns:pvml="urn:schemas-microsoft-com:office:powerpoint" xmlns:com="http://schemas.openxmlformats.org/drawingml/2006/compatibility" xmlns:p14="http://schemas.microsoft.com/office/powerpoint/2010/main" xmlns:p15="http://schemas.microsoft.com/office/powerpoint/2012/main">
+  <p:cSld>
+    <p:spTree>
+      <p:nvGrpSpPr>
+        <p:cNvPr id="257" name="Shape 257"/>
+        <p:cNvGrpSpPr/>
+        <p:nvPr/>
+      </p:nvGrpSpPr>
+      <p:grpSpPr>
+        <a:xfrm>
+          <a:off x="0" y="0"/>
+          <a:ext cx="0" cy="0"/>
+          <a:chOff x="0" y="0"/>
+          <a:chExt cx="0" cy="0"/>
+        </a:xfrm>
+      </p:grpSpPr>
       <p:sp>
         <p:nvSpPr>
-          <p:cNvPr id="253" name="Google Shape;253;p20"/>
+          <p:cNvPr id="258" name="Google Shape;258;p21"/>
           <p:cNvSpPr txBox="1"/>
           <p:nvPr/>
         </p:nvSpPr>
@@ -16594,7 +16800,7 @@
       </p:sp>
       <p:pic>
         <p:nvPicPr>
-          <p:cNvPr id="254" name="Google Shape;254;p20"/>
+          <p:cNvPr id="259" name="Google Shape;259;p21"/>
           <p:cNvPicPr preferRelativeResize="0"/>
           <p:nvPr/>
         </p:nvPicPr>
@@ -16622,7 +16828,7 @@
       </p:pic>
       <p:pic>
         <p:nvPicPr>
-          <p:cNvPr id="255" name="Google Shape;255;p20"/>
+          <p:cNvPr id="260" name="Google Shape;260;p21"/>
           <p:cNvPicPr preferRelativeResize="0"/>
           <p:nvPr/>
         </p:nvPicPr>
@@ -16656,12 +16862,12 @@
 </p:sld>
 </file>
 
-<file path=ppt/slides/slide8.xml><?xml version="1.0" encoding="utf-8"?>
+<file path=ppt/slides/slide9.xml><?xml version="1.0" encoding="utf-8"?>
 <p:sld xmlns:a="http://schemas.openxmlformats.org/drawingml/2006/main" xmlns:r="http://schemas.openxmlformats.org/officeDocument/2006/relationships" xmlns:mc="http://schemas.openxmlformats.org/markup-compatibility/2006" xmlns:mv="urn:schemas-microsoft-com:mac:vml" xmlns:p="http://schemas.openxmlformats.org/presentationml/2006/main" xmlns:c="http://schemas.openxmlformats.org/drawingml/2006/chart" xmlns:dgm="http://schemas.openxmlformats.org/drawingml/2006/diagram" xmlns:o="urn:schemas-microsoft-com:office:office" xmlns:v="urn:schemas-microsoft-com:vml" xmlns:pvml="urn:schemas-microsoft-com:office:powerpoint" xmlns:com="http://schemas.openxmlformats.org/drawingml/2006/compatibility" xmlns:p14="http://schemas.microsoft.com/office/powerpoint/2010/main" xmlns:p15="http://schemas.microsoft.com/office/powerpoint/2012/main">
   <p:cSld>
     <p:spTree>
       <p:nvGrpSpPr>
-        <p:cNvPr id="259" name="Shape 259"/>
+        <p:cNvPr id="264" name="Shape 264"/>
         <p:cNvGrpSpPr/>
         <p:nvPr/>
       </p:nvGrpSpPr>
@@ -16675,7 +16881,7 @@
       </p:grpSpPr>
       <p:sp>
         <p:nvSpPr>
-          <p:cNvPr id="260" name="Google Shape;260;p21"/>
+          <p:cNvPr id="265" name="Google Shape;265;p22"/>
           <p:cNvSpPr txBox="1"/>
           <p:nvPr/>
         </p:nvSpPr>
@@ -16727,7 +16933,7 @@
       </p:sp>
       <p:sp>
         <p:nvSpPr>
-          <p:cNvPr id="261" name="Google Shape;261;p21"/>
+          <p:cNvPr id="266" name="Google Shape;266;p22"/>
           <p:cNvSpPr txBox="1"/>
           <p:nvPr/>
         </p:nvSpPr>
@@ -16779,7 +16985,7 @@
       </p:sp>
       <p:pic>
         <p:nvPicPr>
-          <p:cNvPr id="262" name="Google Shape;262;p21"/>
+          <p:cNvPr id="267" name="Google Shape;267;p22"/>
           <p:cNvPicPr preferRelativeResize="0"/>
           <p:nvPr/>
         </p:nvPicPr>
@@ -16807,7 +17013,7 @@
       </p:pic>
       <p:sp>
         <p:nvSpPr>
-          <p:cNvPr id="263" name="Google Shape;263;p21"/>
+          <p:cNvPr id="268" name="Google Shape;268;p22"/>
           <p:cNvSpPr txBox="1"/>
           <p:nvPr/>
         </p:nvSpPr>
@@ -16929,7 +17135,7 @@
       </p:sp>
       <p:pic>
         <p:nvPicPr>
-          <p:cNvPr id="264" name="Google Shape;264;p21"/>
+          <p:cNvPr id="269" name="Google Shape;269;p22"/>
           <p:cNvPicPr preferRelativeResize="0"/>
           <p:nvPr/>
         </p:nvPicPr>
@@ -16957,7 +17163,7 @@
       </p:pic>
       <p:sp>
         <p:nvSpPr>
-          <p:cNvPr id="265" name="Google Shape;265;p21"/>
+          <p:cNvPr id="270" name="Google Shape;270;p22"/>
           <p:cNvSpPr txBox="1"/>
           <p:nvPr/>
         </p:nvSpPr>
@@ -17129,59 +17335,6 @@
           </a:p>
         </p:txBody>
       </p:sp>
-    </p:spTree>
-  </p:cSld>
-  <p:clrMapOvr>
-    <a:masterClrMapping/>
-  </p:clrMapOvr>
-</p:sld>
-</file>
-
-<file path=ppt/slides/slide9.xml><?xml version="1.0" encoding="utf-8"?>
-<p:sld xmlns:a="http://schemas.openxmlformats.org/drawingml/2006/main" xmlns:r="http://schemas.openxmlformats.org/officeDocument/2006/relationships" xmlns:mc="http://schemas.openxmlformats.org/markup-compatibility/2006" xmlns:mv="urn:schemas-microsoft-com:mac:vml" xmlns:p="http://schemas.openxmlformats.org/presentationml/2006/main" xmlns:c="http://schemas.openxmlformats.org/drawingml/2006/chart" xmlns:dgm="http://schemas.openxmlformats.org/drawingml/2006/diagram" xmlns:o="urn:schemas-microsoft-com:office:office" xmlns:v="urn:schemas-microsoft-com:vml" xmlns:pvml="urn:schemas-microsoft-com:office:powerpoint" xmlns:com="http://schemas.openxmlformats.org/drawingml/2006/compatibility" xmlns:p14="http://schemas.microsoft.com/office/powerpoint/2010/main" xmlns:p15="http://schemas.microsoft.com/office/powerpoint/2012/main">
-  <p:cSld>
-    <p:spTree>
-      <p:nvGrpSpPr>
-        <p:cNvPr id="269" name="Shape 269"/>
-        <p:cNvGrpSpPr/>
-        <p:nvPr/>
-      </p:nvGrpSpPr>
-      <p:grpSpPr>
-        <a:xfrm>
-          <a:off x="0" y="0"/>
-          <a:ext cx="0" cy="0"/>
-          <a:chOff x="0" y="0"/>
-          <a:chExt cx="0" cy="0"/>
-        </a:xfrm>
-      </p:grpSpPr>
-      <p:pic>
-        <p:nvPicPr>
-          <p:cNvPr id="270" name="Google Shape;270;p22"/>
-          <p:cNvPicPr preferRelativeResize="0"/>
-          <p:nvPr/>
-        </p:nvPicPr>
-        <p:blipFill>
-          <a:blip r:embed="rId3">
-            <a:alphaModFix/>
-          </a:blip>
-          <a:stretch>
-            <a:fillRect/>
-          </a:stretch>
-        </p:blipFill>
-        <p:spPr>
-          <a:xfrm>
-            <a:off x="152400" y="152400"/>
-            <a:ext cx="5735671" cy="4838701"/>
-          </a:xfrm>
-          <a:prstGeom prst="rect">
-            <a:avLst/>
-          </a:prstGeom>
-          <a:noFill/>
-          <a:ln>
-            <a:noFill/>
-          </a:ln>
-        </p:spPr>
-      </p:pic>
     </p:spTree>
   </p:cSld>
   <p:clrMapOvr>

</xml_diff>